<commit_message>
ultimo antes de angular
</commit_message>
<xml_diff>
--- a/Stock.pptx
+++ b/Stock.pptx
@@ -243,7 +243,7 @@
           <a:p>
             <a:fld id="{061DF497-0ACA-457F-88A6-7E6E455CB3C5}" type="datetimeFigureOut">
               <a:rPr lang="es-ES" smtClean="0"/>
-              <a:t>07/04/2022</a:t>
+              <a:t>11/04/2022</a:t>
             </a:fld>
             <a:endParaRPr lang="es-ES"/>
           </a:p>
@@ -413,7 +413,7 @@
           <a:p>
             <a:fld id="{061DF497-0ACA-457F-88A6-7E6E455CB3C5}" type="datetimeFigureOut">
               <a:rPr lang="es-ES" smtClean="0"/>
-              <a:t>07/04/2022</a:t>
+              <a:t>11/04/2022</a:t>
             </a:fld>
             <a:endParaRPr lang="es-ES"/>
           </a:p>
@@ -593,7 +593,7 @@
           <a:p>
             <a:fld id="{061DF497-0ACA-457F-88A6-7E6E455CB3C5}" type="datetimeFigureOut">
               <a:rPr lang="es-ES" smtClean="0"/>
-              <a:t>07/04/2022</a:t>
+              <a:t>11/04/2022</a:t>
             </a:fld>
             <a:endParaRPr lang="es-ES"/>
           </a:p>
@@ -763,7 +763,7 @@
           <a:p>
             <a:fld id="{061DF497-0ACA-457F-88A6-7E6E455CB3C5}" type="datetimeFigureOut">
               <a:rPr lang="es-ES" smtClean="0"/>
-              <a:t>07/04/2022</a:t>
+              <a:t>11/04/2022</a:t>
             </a:fld>
             <a:endParaRPr lang="es-ES"/>
           </a:p>
@@ -1009,7 +1009,7 @@
           <a:p>
             <a:fld id="{061DF497-0ACA-457F-88A6-7E6E455CB3C5}" type="datetimeFigureOut">
               <a:rPr lang="es-ES" smtClean="0"/>
-              <a:t>07/04/2022</a:t>
+              <a:t>11/04/2022</a:t>
             </a:fld>
             <a:endParaRPr lang="es-ES"/>
           </a:p>
@@ -1241,7 +1241,7 @@
           <a:p>
             <a:fld id="{061DF497-0ACA-457F-88A6-7E6E455CB3C5}" type="datetimeFigureOut">
               <a:rPr lang="es-ES" smtClean="0"/>
-              <a:t>07/04/2022</a:t>
+              <a:t>11/04/2022</a:t>
             </a:fld>
             <a:endParaRPr lang="es-ES"/>
           </a:p>
@@ -1608,7 +1608,7 @@
           <a:p>
             <a:fld id="{061DF497-0ACA-457F-88A6-7E6E455CB3C5}" type="datetimeFigureOut">
               <a:rPr lang="es-ES" smtClean="0"/>
-              <a:t>07/04/2022</a:t>
+              <a:t>11/04/2022</a:t>
             </a:fld>
             <a:endParaRPr lang="es-ES"/>
           </a:p>
@@ -1726,7 +1726,7 @@
           <a:p>
             <a:fld id="{061DF497-0ACA-457F-88A6-7E6E455CB3C5}" type="datetimeFigureOut">
               <a:rPr lang="es-ES" smtClean="0"/>
-              <a:t>07/04/2022</a:t>
+              <a:t>11/04/2022</a:t>
             </a:fld>
             <a:endParaRPr lang="es-ES"/>
           </a:p>
@@ -1821,7 +1821,7 @@
           <a:p>
             <a:fld id="{061DF497-0ACA-457F-88A6-7E6E455CB3C5}" type="datetimeFigureOut">
               <a:rPr lang="es-ES" smtClean="0"/>
-              <a:t>07/04/2022</a:t>
+              <a:t>11/04/2022</a:t>
             </a:fld>
             <a:endParaRPr lang="es-ES"/>
           </a:p>
@@ -2098,7 +2098,7 @@
           <a:p>
             <a:fld id="{061DF497-0ACA-457F-88A6-7E6E455CB3C5}" type="datetimeFigureOut">
               <a:rPr lang="es-ES" smtClean="0"/>
-              <a:t>07/04/2022</a:t>
+              <a:t>11/04/2022</a:t>
             </a:fld>
             <a:endParaRPr lang="es-ES"/>
           </a:p>
@@ -2351,7 +2351,7 @@
           <a:p>
             <a:fld id="{061DF497-0ACA-457F-88A6-7E6E455CB3C5}" type="datetimeFigureOut">
               <a:rPr lang="es-ES" smtClean="0"/>
-              <a:t>07/04/2022</a:t>
+              <a:t>11/04/2022</a:t>
             </a:fld>
             <a:endParaRPr lang="es-ES"/>
           </a:p>
@@ -2564,7 +2564,7 @@
           <a:p>
             <a:fld id="{061DF497-0ACA-457F-88A6-7E6E455CB3C5}" type="datetimeFigureOut">
               <a:rPr lang="es-ES" smtClean="0"/>
-              <a:t>07/04/2022</a:t>
+              <a:t>11/04/2022</a:t>
             </a:fld>
             <a:endParaRPr lang="es-ES"/>
           </a:p>
@@ -4068,12 +4068,12 @@
                     <a:p>
                       <a:pPr algn="l" fontAlgn="b"/>
                       <a:r>
-                        <a:rPr lang="es-ES" sz="1100" u="none" strike="noStrike">
+                        <a:rPr lang="es-ES" sz="1100" u="none" strike="noStrike" dirty="0">
                           <a:effectLst/>
                         </a:rPr>
                         <a:t>Stock</a:t>
                       </a:r>
-                      <a:endParaRPr lang="es-ES" sz="1100" b="0" i="0" u="none" strike="noStrike">
+                      <a:endParaRPr lang="es-ES" sz="1100" b="0" i="0" u="none" strike="noStrike" dirty="0">
                         <a:solidFill>
                           <a:srgbClr val="000000"/>
                         </a:solidFill>
@@ -5704,14 +5704,14 @@
           <p:nvPr>
             <p:extLst>
               <p:ext uri="{D42A27DB-BD31-4B8C-83A1-F6EECF244321}">
-                <p14:modId xmlns:p14="http://schemas.microsoft.com/office/powerpoint/2010/main" val="264015212"/>
+                <p14:modId xmlns:p14="http://schemas.microsoft.com/office/powerpoint/2010/main" val="2225085853"/>
               </p:ext>
             </p:extLst>
           </p:nvPr>
         </p:nvGraphicFramePr>
         <p:xfrm>
           <a:off x="9405036" y="118368"/>
-          <a:ext cx="1168400" cy="762000"/>
+          <a:ext cx="1168400" cy="1083945"/>
         </p:xfrm>
         <a:graphic>
           <a:graphicData uri="http://schemas.openxmlformats.org/drawingml/2006/table">
@@ -5730,10 +5730,10 @@
                     <a:p>
                       <a:pPr algn="l" fontAlgn="b"/>
                       <a:r>
-                        <a:rPr lang="es-ES" sz="1100" u="none" strike="noStrike" dirty="0" err="1">
-                          <a:effectLst/>
-                        </a:rPr>
-                        <a:t>Posicion</a:t>
+                        <a:rPr lang="es-ES" sz="1100" u="none" strike="noStrike" dirty="0" smtClean="0">
+                          <a:effectLst/>
+                        </a:rPr>
+                        <a:t>Deposito</a:t>
                       </a:r>
                       <a:endParaRPr lang="es-ES" sz="1100" b="0" i="0" u="none" strike="noStrike" dirty="0">
                         <a:solidFill>
@@ -5792,10 +5792,36 @@
                     <a:p>
                       <a:pPr algn="l" fontAlgn="b"/>
                       <a:r>
-                        <a:rPr lang="es-ES" sz="1100" u="none" strike="noStrike" dirty="0">
-                          <a:effectLst/>
-                        </a:rPr>
-                        <a:t>Id</a:t>
+                        <a:rPr lang="es-ES" sz="1100" u="none" strike="noStrike" dirty="0" smtClean="0">
+                          <a:effectLst/>
+                        </a:rPr>
+                        <a:t>Id Deposito</a:t>
+                      </a:r>
+                    </a:p>
+                    <a:p>
+                      <a:pPr algn="l" fontAlgn="b"/>
+                      <a:r>
+                        <a:rPr lang="es-419" sz="1100" b="0" i="0" u="none" strike="noStrike" dirty="0" smtClean="0">
+                          <a:solidFill>
+                            <a:srgbClr val="000000"/>
+                          </a:solidFill>
+                          <a:effectLst/>
+                          <a:latin typeface="Calibri" panose="020F0502020204030204" pitchFamily="34" charset="0"/>
+                        </a:rPr>
+                        <a:t>Zona</a:t>
+                      </a:r>
+                    </a:p>
+                    <a:p>
+                      <a:pPr algn="l" fontAlgn="b"/>
+                      <a:r>
+                        <a:rPr lang="es-419" sz="1100" b="0" i="0" u="none" strike="noStrike" dirty="0" err="1" smtClean="0">
+                          <a:solidFill>
+                            <a:srgbClr val="000000"/>
+                          </a:solidFill>
+                          <a:effectLst/>
+                          <a:latin typeface="Calibri" panose="020F0502020204030204" pitchFamily="34" charset="0"/>
+                        </a:rPr>
+                        <a:t>Posicion</a:t>
                       </a:r>
                       <a:endParaRPr lang="es-ES" sz="1100" b="0" i="0" u="none" strike="noStrike" dirty="0">
                         <a:solidFill>
@@ -5844,12 +5870,6 @@
                     <a:lstStyle/>
                     <a:p>
                       <a:pPr algn="l" fontAlgn="b"/>
-                      <a:r>
-                        <a:rPr lang="es-ES" sz="1100" u="none" strike="noStrike" dirty="0">
-                          <a:effectLst/>
-                        </a:rPr>
-                        <a:t>Deposito</a:t>
-                      </a:r>
                       <a:endParaRPr lang="es-ES" sz="1100" b="0" i="0" u="none" strike="noStrike" dirty="0">
                         <a:solidFill>
                           <a:srgbClr val="000000"/>
@@ -5947,7 +5967,7 @@
           <p:nvPr>
             <p:extLst>
               <p:ext uri="{D42A27DB-BD31-4B8C-83A1-F6EECF244321}">
-                <p14:modId xmlns:p14="http://schemas.microsoft.com/office/powerpoint/2010/main" val="468356552"/>
+                <p14:modId xmlns:p14="http://schemas.microsoft.com/office/powerpoint/2010/main" val="2268237263"/>
               </p:ext>
             </p:extLst>
           </p:nvPr>
@@ -6105,12 +6125,18 @@
                     <a:p>
                       <a:pPr algn="l" fontAlgn="b"/>
                       <a:r>
-                        <a:rPr lang="es-ES" sz="1100" u="none" strike="noStrike">
-                          <a:effectLst/>
-                        </a:rPr>
-                        <a:t>Id Pos</a:t>
-                      </a:r>
-                      <a:endParaRPr lang="es-ES" sz="1100" b="0" i="0" u="none" strike="noStrike">
+                        <a:rPr lang="es-ES" sz="1100" u="none" strike="noStrike" dirty="0">
+                          <a:effectLst/>
+                        </a:rPr>
+                        <a:t>Id </a:t>
+                      </a:r>
+                      <a:r>
+                        <a:rPr lang="es-ES" sz="1100" u="none" strike="noStrike" dirty="0" smtClean="0">
+                          <a:effectLst/>
+                        </a:rPr>
+                        <a:t>Deposito</a:t>
+                      </a:r>
+                      <a:endParaRPr lang="es-ES" sz="1100" b="0" i="0" u="none" strike="noStrike" dirty="0">
                         <a:solidFill>
                           <a:srgbClr val="000000"/>
                         </a:solidFill>
@@ -6216,255 +6242,6 @@
                       <a:noFill/>
                       <a:prstDash val="solid"/>
                     </a:lnBlToTr>
-                  </a:tcPr>
-                </a:tc>
-              </a:tr>
-            </a:tbl>
-          </a:graphicData>
-        </a:graphic>
-      </p:graphicFrame>
-      <p:graphicFrame>
-        <p:nvGraphicFramePr>
-          <p:cNvPr id="181" name="Tabla 180"/>
-          <p:cNvGraphicFramePr>
-            <a:graphicFrameLocks noGrp="1"/>
-          </p:cNvGraphicFramePr>
-          <p:nvPr>
-            <p:extLst>
-              <p:ext uri="{D42A27DB-BD31-4B8C-83A1-F6EECF244321}">
-                <p14:modId xmlns:p14="http://schemas.microsoft.com/office/powerpoint/2010/main" val="2015995581"/>
-              </p:ext>
-            </p:extLst>
-          </p:nvPr>
-        </p:nvGraphicFramePr>
-        <p:xfrm>
-          <a:off x="11122025" y="119678"/>
-          <a:ext cx="977900" cy="762000"/>
-        </p:xfrm>
-        <a:graphic>
-          <a:graphicData uri="http://schemas.openxmlformats.org/drawingml/2006/table">
-            <a:tbl>
-              <a:tblPr>
-                <a:tableStyleId>{5C22544A-7EE6-4342-B048-85BDC9FD1C3A}</a:tableStyleId>
-              </a:tblPr>
-              <a:tblGrid>
-                <a:gridCol w="977900"/>
-              </a:tblGrid>
-              <a:tr h="190500">
-                <a:tc>
-                  <a:txBody>
-                    <a:bodyPr/>
-                    <a:lstStyle/>
-                    <a:p>
-                      <a:pPr algn="l" fontAlgn="b"/>
-                      <a:r>
-                        <a:rPr lang="es-ES" sz="1100" u="sng" strike="noStrike" dirty="0">
-                          <a:effectLst/>
-                        </a:rPr>
-                        <a:t>Deposito</a:t>
-                      </a:r>
-                      <a:endParaRPr lang="es-ES" sz="1100" b="0" i="0" u="sng" strike="noStrike" dirty="0">
-                        <a:solidFill>
-                          <a:srgbClr val="000000"/>
-                        </a:solidFill>
-                        <a:effectLst/>
-                        <a:latin typeface="Calibri" panose="020F0502020204030204" pitchFamily="34" charset="0"/>
-                      </a:endParaRPr>
-                    </a:p>
-                  </a:txBody>
-                  <a:tcPr marL="9525" marR="9525" marT="9525" marB="0" anchor="b">
-                    <a:lnL w="12700" cap="flat" cmpd="sng" algn="ctr">
-                      <a:solidFill>
-                        <a:schemeClr val="tx1"/>
-                      </a:solidFill>
-                      <a:prstDash val="solid"/>
-                      <a:round/>
-                      <a:headEnd type="none" w="med" len="med"/>
-                      <a:tailEnd type="none" w="med" len="med"/>
-                    </a:lnL>
-                    <a:lnR w="12700" cap="flat" cmpd="sng" algn="ctr">
-                      <a:solidFill>
-                        <a:schemeClr val="tx1"/>
-                      </a:solidFill>
-                      <a:prstDash val="solid"/>
-                      <a:round/>
-                      <a:headEnd type="none" w="med" len="med"/>
-                      <a:tailEnd type="none" w="med" len="med"/>
-                    </a:lnR>
-                    <a:lnT w="12700" cap="flat" cmpd="sng" algn="ctr">
-                      <a:solidFill>
-                        <a:schemeClr val="tx1"/>
-                      </a:solidFill>
-                      <a:prstDash val="solid"/>
-                      <a:round/>
-                      <a:headEnd type="none" w="med" len="med"/>
-                      <a:tailEnd type="none" w="med" len="med"/>
-                    </a:lnT>
-                    <a:lnB w="12700" cap="flat" cmpd="sng" algn="ctr">
-                      <a:solidFill>
-                        <a:schemeClr val="tx1"/>
-                      </a:solidFill>
-                      <a:prstDash val="solid"/>
-                      <a:round/>
-                      <a:headEnd type="none" w="med" len="med"/>
-                      <a:tailEnd type="none" w="med" len="med"/>
-                    </a:lnB>
-                  </a:tcPr>
-                </a:tc>
-              </a:tr>
-              <a:tr h="190500">
-                <a:tc>
-                  <a:txBody>
-                    <a:bodyPr/>
-                    <a:lstStyle/>
-                    <a:p>
-                      <a:pPr algn="l" fontAlgn="b"/>
-                      <a:r>
-                        <a:rPr lang="es-ES" sz="1100" u="sng" strike="noStrike" dirty="0">
-                          <a:effectLst/>
-                        </a:rPr>
-                        <a:t>Id</a:t>
-                      </a:r>
-                      <a:endParaRPr lang="es-ES" sz="1100" b="0" i="0" u="sng" strike="noStrike" dirty="0">
-                        <a:solidFill>
-                          <a:srgbClr val="000000"/>
-                        </a:solidFill>
-                        <a:effectLst/>
-                        <a:latin typeface="Calibri" panose="020F0502020204030204" pitchFamily="34" charset="0"/>
-                      </a:endParaRPr>
-                    </a:p>
-                  </a:txBody>
-                  <a:tcPr marL="9525" marR="9525" marT="9525" marB="0" anchor="b">
-                    <a:lnL w="12700" cap="flat" cmpd="sng" algn="ctr">
-                      <a:solidFill>
-                        <a:schemeClr val="tx1"/>
-                      </a:solidFill>
-                      <a:prstDash val="solid"/>
-                      <a:round/>
-                      <a:headEnd type="none" w="med" len="med"/>
-                      <a:tailEnd type="none" w="med" len="med"/>
-                    </a:lnL>
-                    <a:lnR w="12700" cap="flat" cmpd="sng" algn="ctr">
-                      <a:solidFill>
-                        <a:schemeClr val="tx1"/>
-                      </a:solidFill>
-                      <a:prstDash val="solid"/>
-                      <a:round/>
-                      <a:headEnd type="none" w="med" len="med"/>
-                      <a:tailEnd type="none" w="med" len="med"/>
-                    </a:lnR>
-                    <a:lnT w="12700" cap="flat" cmpd="sng" algn="ctr">
-                      <a:solidFill>
-                        <a:schemeClr val="tx1"/>
-                      </a:solidFill>
-                      <a:prstDash val="solid"/>
-                      <a:round/>
-                      <a:headEnd type="none" w="med" len="med"/>
-                      <a:tailEnd type="none" w="med" len="med"/>
-                    </a:lnT>
-                  </a:tcPr>
-                </a:tc>
-              </a:tr>
-              <a:tr h="190500">
-                <a:tc>
-                  <a:txBody>
-                    <a:bodyPr/>
-                    <a:lstStyle/>
-                    <a:p>
-                      <a:pPr algn="l" fontAlgn="b"/>
-                      <a:r>
-                        <a:rPr lang="es-ES" sz="1100" u="sng" strike="noStrike" dirty="0" err="1">
-                          <a:effectLst/>
-                        </a:rPr>
-                        <a:t>Posicion</a:t>
-                      </a:r>
-                      <a:r>
-                        <a:rPr lang="es-ES" sz="1100" u="sng" strike="noStrike" dirty="0">
-                          <a:effectLst/>
-                        </a:rPr>
-                        <a:t> &lt;lista&gt;</a:t>
-                      </a:r>
-                      <a:endParaRPr lang="es-ES" sz="1100" b="0" i="0" u="sng" strike="noStrike" dirty="0">
-                        <a:solidFill>
-                          <a:srgbClr val="000000"/>
-                        </a:solidFill>
-                        <a:effectLst/>
-                        <a:latin typeface="Calibri" panose="020F0502020204030204" pitchFamily="34" charset="0"/>
-                      </a:endParaRPr>
-                    </a:p>
-                  </a:txBody>
-                  <a:tcPr marL="9525" marR="9525" marT="9525" marB="0" anchor="b">
-                    <a:lnL w="12700" cap="flat" cmpd="sng" algn="ctr">
-                      <a:solidFill>
-                        <a:schemeClr val="tx1"/>
-                      </a:solidFill>
-                      <a:prstDash val="solid"/>
-                      <a:round/>
-                      <a:headEnd type="none" w="med" len="med"/>
-                      <a:tailEnd type="none" w="med" len="med"/>
-                    </a:lnL>
-                    <a:lnR w="12700" cap="flat" cmpd="sng" algn="ctr">
-                      <a:solidFill>
-                        <a:schemeClr val="tx1"/>
-                      </a:solidFill>
-                      <a:prstDash val="solid"/>
-                      <a:round/>
-                      <a:headEnd type="none" w="med" len="med"/>
-                      <a:tailEnd type="none" w="med" len="med"/>
-                    </a:lnR>
-                  </a:tcPr>
-                </a:tc>
-              </a:tr>
-              <a:tr h="190500">
-                <a:tc>
-                  <a:txBody>
-                    <a:bodyPr/>
-                    <a:lstStyle/>
-                    <a:p>
-                      <a:pPr algn="l" fontAlgn="b"/>
-                      <a:r>
-                        <a:rPr lang="es-ES" sz="1100" u="sng" strike="noStrike" dirty="0">
-                          <a:effectLst/>
-                        </a:rPr>
-                        <a:t> </a:t>
-                      </a:r>
-                      <a:endParaRPr lang="es-ES" sz="1100" b="0" i="0" u="sng" strike="noStrike" dirty="0">
-                        <a:solidFill>
-                          <a:srgbClr val="000000"/>
-                        </a:solidFill>
-                        <a:effectLst/>
-                        <a:latin typeface="Calibri" panose="020F0502020204030204" pitchFamily="34" charset="0"/>
-                      </a:endParaRPr>
-                    </a:p>
-                  </a:txBody>
-                  <a:tcPr marL="9525" marR="9525" marT="9525" marB="0" anchor="b">
-                    <a:lnL w="12700" cap="flat" cmpd="sng" algn="ctr">
-                      <a:solidFill>
-                        <a:schemeClr val="tx1"/>
-                      </a:solidFill>
-                      <a:prstDash val="solid"/>
-                      <a:round/>
-                      <a:headEnd type="none" w="med" len="med"/>
-                      <a:tailEnd type="none" w="med" len="med"/>
-                    </a:lnL>
-                    <a:lnR w="12700" cap="flat" cmpd="sng" algn="ctr">
-                      <a:solidFill>
-                        <a:schemeClr val="tx1"/>
-                      </a:solidFill>
-                      <a:prstDash val="solid"/>
-                      <a:round/>
-                      <a:headEnd type="none" w="med" len="med"/>
-                      <a:tailEnd type="none" w="med" len="med"/>
-                    </a:lnR>
-                    <a:lnB w="12700" cap="flat" cmpd="sng" algn="ctr">
-                      <a:solidFill>
-                        <a:schemeClr val="tx1"/>
-                      </a:solidFill>
-                      <a:prstDash val="solid"/>
-                      <a:round/>
-                      <a:headEnd type="none" w="med" len="med"/>
-                      <a:tailEnd type="none" w="med" len="med"/>
-                    </a:lnB>
                   </a:tcPr>
                 </a:tc>
               </a:tr>
@@ -7287,46 +7064,14 @@
           <p:nvPr/>
         </p:nvCxnSpPr>
         <p:spPr>
-          <a:xfrm rot="5400000">
-            <a:off x="9417114" y="522300"/>
-            <a:ext cx="214054" cy="930190"/>
+          <a:xfrm rot="5400000" flipH="1">
+            <a:off x="9470195" y="683273"/>
+            <a:ext cx="107891" cy="930190"/>
           </a:xfrm>
-          <a:prstGeom prst="bentConnector2">
-            <a:avLst/>
-          </a:prstGeom>
-        </p:spPr>
-        <p:style>
-          <a:lnRef idx="1">
-            <a:schemeClr val="accent1"/>
-          </a:lnRef>
-          <a:fillRef idx="0">
-            <a:schemeClr val="accent1"/>
-          </a:fillRef>
-          <a:effectRef idx="0">
-            <a:schemeClr val="accent1"/>
-          </a:effectRef>
-          <a:fontRef idx="minor">
-            <a:schemeClr val="tx1"/>
-          </a:fontRef>
-        </p:style>
-      </p:cxnSp>
-      <p:cxnSp>
-        <p:nvCxnSpPr>
-          <p:cNvPr id="199" name="Conector angular 198"/>
-          <p:cNvCxnSpPr>
-            <a:stCxn id="181" idx="1"/>
-            <a:endCxn id="179" idx="3"/>
-          </p:cNvCxnSpPr>
-          <p:nvPr/>
-        </p:nvCxnSpPr>
-        <p:spPr>
-          <a:xfrm rot="10800000">
-            <a:off x="10573437" y="499368"/>
-            <a:ext cx="548589" cy="1310"/>
-          </a:xfrm>
-          <a:prstGeom prst="bentConnector3">
+          <a:prstGeom prst="bentConnector4">
             <a:avLst>
-              <a:gd name="adj1" fmla="val 50000"/>
+              <a:gd name="adj1" fmla="val -211881"/>
+              <a:gd name="adj2" fmla="val 81402"/>
             </a:avLst>
           </a:prstGeom>
         </p:spPr>

</xml_diff>